<commit_message>
Correct type in exclusion numbers
</commit_message>
<xml_diff>
--- a/Prisma_flow_diagram.pptx
+++ b/Prisma_flow_diagram.pptx
@@ -4105,7 +4105,7 @@
                 <a:ea typeface="Calibri" panose="020F0502020204030204" pitchFamily="34" charset="0"/>
                 <a:cs typeface="Arial" panose="020B0604020202020204" pitchFamily="34" charset="0"/>
               </a:rPr>
-              <a:t>186</a:t>
+              <a:t>187</a:t>
             </a:r>
             <a:r>
               <a:rPr kumimoji="0" lang="en-AU" altLang="nl-NL" sz="900" b="0" i="0" u="none" strike="noStrike" cap="none" normalizeH="0" baseline="0" dirty="0">
@@ -4321,8 +4321,35 @@
                 <a:ea typeface="Calibri" panose="020F0502020204030204" pitchFamily="34" charset="0"/>
                 <a:cs typeface="Arial" panose="020B0604020202020204" pitchFamily="34" charset="0"/>
               </a:rPr>
-              <a:t> = 173)</a:t>
-            </a:r>
+              <a:t> </a:t>
+            </a:r>
+            <a:r>
+              <a:rPr kumimoji="0" lang="en-AU" altLang="nl-NL" sz="900" b="0" i="0" u="none" strike="noStrike" cap="none" normalizeH="0" baseline="0">
+                <a:ln>
+                  <a:noFill/>
+                </a:ln>
+                <a:solidFill>
+                  <a:srgbClr val="000000"/>
+                </a:solidFill>
+                <a:effectLst/>
+                <a:latin typeface="Arial" panose="020B0604020202020204" pitchFamily="34" charset="0"/>
+                <a:ea typeface="Calibri" panose="020F0502020204030204" pitchFamily="34" charset="0"/>
+                <a:cs typeface="Arial" panose="020B0604020202020204" pitchFamily="34" charset="0"/>
+              </a:rPr>
+              <a:t>= 174)</a:t>
+            </a:r>
+            <a:endParaRPr kumimoji="0" lang="en-AU" altLang="nl-NL" sz="900" b="0" i="0" u="none" strike="noStrike" cap="none" normalizeH="0" baseline="0" dirty="0">
+              <a:ln>
+                <a:noFill/>
+              </a:ln>
+              <a:solidFill>
+                <a:srgbClr val="000000"/>
+              </a:solidFill>
+              <a:effectLst/>
+              <a:latin typeface="Arial" panose="020B0604020202020204" pitchFamily="34" charset="0"/>
+              <a:ea typeface="Calibri" panose="020F0502020204030204" pitchFamily="34" charset="0"/>
+              <a:cs typeface="Arial" panose="020B0604020202020204" pitchFamily="34" charset="0"/>
+            </a:endParaRPr>
           </a:p>
         </p:txBody>
       </p:sp>

</xml_diff>